<commit_message>
Final version of admin part of workshop
</commit_message>
<xml_diff>
--- a/slides/KubernetesStorage.pptx
+++ b/slides/KubernetesStorage.pptx
@@ -141,6 +141,11 @@
       </a:defRPr>
     </a:lvl9pPr>
   </p:defaultTextStyle>
+  <p:extLst>
+    <p:ext uri="{EFAFB233-063F-42B5-8137-9DF3F51BA10A}">
+      <p15:sldGuideLst xmlns:p15="http://schemas.microsoft.com/office/powerpoint/2012/main"/>
+    </p:ext>
+  </p:extLst>
 </p:presentation>
 </file>
 
@@ -293,7 +298,7 @@
           <a:p>
             <a:fld id="{DB0C2FE5-8FB8-574D-A4C9-32472DC451E0}" type="datetimeFigureOut">
               <a:rPr lang="pl-PL" smtClean="0"/>
-              <a:t>02.07.2019</a:t>
+              <a:t>08.07.2019</a:t>
             </a:fld>
             <a:endParaRPr lang="pl-PL"/>
           </a:p>
@@ -493,7 +498,7 @@
           <a:p>
             <a:fld id="{DB0C2FE5-8FB8-574D-A4C9-32472DC451E0}" type="datetimeFigureOut">
               <a:rPr lang="pl-PL" smtClean="0"/>
-              <a:t>02.07.2019</a:t>
+              <a:t>08.07.2019</a:t>
             </a:fld>
             <a:endParaRPr lang="pl-PL"/>
           </a:p>
@@ -703,7 +708,7 @@
           <a:p>
             <a:fld id="{DB0C2FE5-8FB8-574D-A4C9-32472DC451E0}" type="datetimeFigureOut">
               <a:rPr lang="pl-PL" smtClean="0"/>
-              <a:t>02.07.2019</a:t>
+              <a:t>08.07.2019</a:t>
             </a:fld>
             <a:endParaRPr lang="pl-PL"/>
           </a:p>
@@ -903,7 +908,7 @@
           <a:p>
             <a:fld id="{DB0C2FE5-8FB8-574D-A4C9-32472DC451E0}" type="datetimeFigureOut">
               <a:rPr lang="pl-PL" smtClean="0"/>
-              <a:t>02.07.2019</a:t>
+              <a:t>08.07.2019</a:t>
             </a:fld>
             <a:endParaRPr lang="pl-PL"/>
           </a:p>
@@ -1179,7 +1184,7 @@
           <a:p>
             <a:fld id="{DB0C2FE5-8FB8-574D-A4C9-32472DC451E0}" type="datetimeFigureOut">
               <a:rPr lang="pl-PL" smtClean="0"/>
-              <a:t>02.07.2019</a:t>
+              <a:t>08.07.2019</a:t>
             </a:fld>
             <a:endParaRPr lang="pl-PL"/>
           </a:p>
@@ -1447,7 +1452,7 @@
           <a:p>
             <a:fld id="{DB0C2FE5-8FB8-574D-A4C9-32472DC451E0}" type="datetimeFigureOut">
               <a:rPr lang="pl-PL" smtClean="0"/>
-              <a:t>02.07.2019</a:t>
+              <a:t>08.07.2019</a:t>
             </a:fld>
             <a:endParaRPr lang="pl-PL"/>
           </a:p>
@@ -1862,7 +1867,7 @@
           <a:p>
             <a:fld id="{DB0C2FE5-8FB8-574D-A4C9-32472DC451E0}" type="datetimeFigureOut">
               <a:rPr lang="pl-PL" smtClean="0"/>
-              <a:t>02.07.2019</a:t>
+              <a:t>08.07.2019</a:t>
             </a:fld>
             <a:endParaRPr lang="pl-PL"/>
           </a:p>
@@ -2004,7 +2009,7 @@
           <a:p>
             <a:fld id="{DB0C2FE5-8FB8-574D-A4C9-32472DC451E0}" type="datetimeFigureOut">
               <a:rPr lang="pl-PL" smtClean="0"/>
-              <a:t>02.07.2019</a:t>
+              <a:t>08.07.2019</a:t>
             </a:fld>
             <a:endParaRPr lang="pl-PL"/>
           </a:p>
@@ -2117,7 +2122,7 @@
           <a:p>
             <a:fld id="{DB0C2FE5-8FB8-574D-A4C9-32472DC451E0}" type="datetimeFigureOut">
               <a:rPr lang="pl-PL" smtClean="0"/>
-              <a:t>02.07.2019</a:t>
+              <a:t>08.07.2019</a:t>
             </a:fld>
             <a:endParaRPr lang="pl-PL"/>
           </a:p>
@@ -2430,7 +2435,7 @@
           <a:p>
             <a:fld id="{DB0C2FE5-8FB8-574D-A4C9-32472DC451E0}" type="datetimeFigureOut">
               <a:rPr lang="pl-PL" smtClean="0"/>
-              <a:t>02.07.2019</a:t>
+              <a:t>08.07.2019</a:t>
             </a:fld>
             <a:endParaRPr lang="pl-PL"/>
           </a:p>
@@ -2719,7 +2724,7 @@
           <a:p>
             <a:fld id="{DB0C2FE5-8FB8-574D-A4C9-32472DC451E0}" type="datetimeFigureOut">
               <a:rPr lang="pl-PL" smtClean="0"/>
-              <a:t>02.07.2019</a:t>
+              <a:t>08.07.2019</a:t>
             </a:fld>
             <a:endParaRPr lang="pl-PL"/>
           </a:p>
@@ -2962,7 +2967,7 @@
           <a:p>
             <a:fld id="{DB0C2FE5-8FB8-574D-A4C9-32472DC451E0}" type="datetimeFigureOut">
               <a:rPr lang="pl-PL" smtClean="0"/>
-              <a:t>02.07.2019</a:t>
+              <a:t>08.07.2019</a:t>
             </a:fld>
             <a:endParaRPr lang="pl-PL"/>
           </a:p>

</xml_diff>